<commit_message>
First attempt for poster
</commit_message>
<xml_diff>
--- a/Documents/הגשת פרויקט/Final_exam_Presentation_no_animation.pptx
+++ b/Documents/הגשת פרויקט/Final_exam_Presentation_no_animation.pptx
@@ -8489,34 +8489,7 @@
                 </a:solidFill>
                 <a:latin typeface="Arial" pitchFamily="34" charset="0"/>
               </a:rPr>
-              <a:t>מולקולת ענק </a:t>
-            </a:r>
-            <a:r>
-              <a:rPr lang="he-IL" sz="1200" kern="1200" dirty="0" smtClean="0">
-                <a:solidFill>
-                  <a:schemeClr val="tx1"/>
-                </a:solidFill>
-                <a:latin typeface="Arial" pitchFamily="34" charset="0"/>
-              </a:rPr>
-              <a:t>-כל </a:t>
-            </a:r>
-            <a:r>
-              <a:rPr lang="he-IL" sz="1200" kern="1200" dirty="0" smtClean="0">
-                <a:solidFill>
-                  <a:schemeClr val="tx1"/>
-                </a:solidFill>
-                <a:latin typeface="Arial" pitchFamily="34" charset="0"/>
-              </a:rPr>
-              <a:t>המידע התורשתי לבניית </a:t>
-            </a:r>
-            <a:r>
-              <a:rPr lang="he-IL" sz="1200" kern="1200" dirty="0" smtClean="0">
-                <a:solidFill>
-                  <a:schemeClr val="tx1"/>
-                </a:solidFill>
-                <a:latin typeface="Arial" pitchFamily="34" charset="0"/>
-              </a:rPr>
-              <a:t>החלבונים </a:t>
+              <a:t>מולקולת ענק -כל המידע התורשתי לבניית החלבונים </a:t>
             </a:r>
           </a:p>
           <a:p>
@@ -8553,11 +8526,6 @@
               </a:rPr>
               <a:t>ניתן לייצג אותו כמחרוזת </a:t>
             </a:r>
-            <a:endParaRPr lang="he-IL" sz="1200" dirty="0" smtClean="0">
-              <a:solidFill>
-                <a:schemeClr val="tx1"/>
-              </a:solidFill>
-            </a:endParaRPr>
           </a:p>
           <a:p>
             <a:pPr marL="0" marR="0" indent="0" algn="r" defTabSz="914400" rtl="1" eaLnBrk="1" fontAlgn="base" latinLnBrk="0" hangingPunct="1">
@@ -8607,15 +8575,7 @@
                   <a:schemeClr val="tx1"/>
                 </a:solidFill>
               </a:rPr>
-              <a:t>סדר </a:t>
-            </a:r>
-            <a:r>
-              <a:rPr lang="he-IL" sz="1200" dirty="0" smtClean="0">
-                <a:solidFill>
-                  <a:schemeClr val="tx1"/>
-                </a:solidFill>
-              </a:rPr>
-              <a:t>הגודל של מחרוזת של </a:t>
+              <a:t>סדר הגודל של מחרוזת של </a:t>
             </a:r>
             <a:r>
               <a:rPr lang="en-US" sz="1200" dirty="0" smtClean="0">
@@ -8698,29 +8658,8 @@
                 <a:ea typeface="+mn-ea"/>
                 <a:cs typeface="+mn-cs"/>
               </a:rPr>
-              <a:t> </a:t>
+              <a:t> משותף</a:t>
             </a:r>
-            <a:r>
-              <a:rPr lang="he-IL" sz="1200" kern="1200" dirty="0" smtClean="0">
-                <a:solidFill>
-                  <a:schemeClr val="tx1"/>
-                </a:solidFill>
-                <a:effectLst/>
-                <a:latin typeface="Arial" pitchFamily="34" charset="0"/>
-                <a:ea typeface="+mn-ea"/>
-                <a:cs typeface="+mn-cs"/>
-              </a:rPr>
-              <a:t>משותף</a:t>
-            </a:r>
-            <a:endParaRPr lang="he-IL" sz="1200" kern="1200" dirty="0" smtClean="0">
-              <a:solidFill>
-                <a:schemeClr val="tx1"/>
-              </a:solidFill>
-              <a:effectLst/>
-              <a:latin typeface="Arial" pitchFamily="34" charset="0"/>
-              <a:ea typeface="+mn-ea"/>
-              <a:cs typeface="+mn-cs"/>
-            </a:endParaRPr>
           </a:p>
           <a:p>
             <a:pPr algn="r" rtl="1"/>
@@ -8766,18 +8705,7 @@
                 <a:ea typeface="+mn-ea"/>
                 <a:cs typeface="+mn-cs"/>
               </a:rPr>
-              <a:t> יכול לעבור </a:t>
-            </a:r>
-            <a:r>
-              <a:rPr lang="he-IL" sz="1200" kern="1200" dirty="0" smtClean="0">
-                <a:solidFill>
-                  <a:schemeClr val="tx1"/>
-                </a:solidFill>
-                <a:latin typeface="Arial" pitchFamily="34" charset="0"/>
-                <a:ea typeface="+mn-ea"/>
-                <a:cs typeface="+mn-cs"/>
-              </a:rPr>
-              <a:t>מוטציה</a:t>
+              <a:t> יכול לעבור מוטציה</a:t>
             </a:r>
           </a:p>
           <a:p>
@@ -8802,18 +8730,7 @@
                 <a:ea typeface="+mn-ea"/>
                 <a:cs typeface="+mn-cs"/>
               </a:rPr>
-              <a:t> רוב המוטציות אינן </a:t>
-            </a:r>
-            <a:r>
-              <a:rPr lang="he-IL" sz="1200" kern="1200" dirty="0" smtClean="0">
-                <a:solidFill>
-                  <a:schemeClr val="tx1"/>
-                </a:solidFill>
-                <a:latin typeface="Arial" pitchFamily="34" charset="0"/>
-                <a:ea typeface="+mn-ea"/>
-                <a:cs typeface="+mn-cs"/>
-              </a:rPr>
-              <a:t>מזיקות,</a:t>
+              <a:t> רוב המוטציות אינן מזיקות,</a:t>
             </a:r>
             <a:r>
               <a:rPr lang="he-IL" sz="1200" kern="1200" baseline="0" dirty="0" smtClean="0">
@@ -9789,8 +9706,36 @@
                 </a:pPr>
                 <a:r>
                   <a:rPr lang="he-IL" dirty="0" smtClean="0"/>
-                  <a:t>כרטיס מסך</a:t>
-                </a:r>
+                  <a:t>כרטיס </a:t>
+                </a:r>
+                <a:r>
+                  <a:rPr lang="he-IL" dirty="0" smtClean="0"/>
+                  <a:t>מסך</a:t>
+                </a:r>
+              </a:p>
+              <a:p>
+                <a:pPr marL="457200" marR="0" lvl="1" indent="0" algn="r" defTabSz="914400" rtl="1" eaLnBrk="1" fontAlgn="base" latinLnBrk="0" hangingPunct="1">
+                  <a:lnSpc>
+                    <a:spcPct val="100000"/>
+                  </a:lnSpc>
+                  <a:spcBef>
+                    <a:spcPct val="30000"/>
+                  </a:spcBef>
+                  <a:spcAft>
+                    <a:spcPct val="0"/>
+                  </a:spcAft>
+                  <a:buClrTx/>
+                  <a:buSzTx/>
+                  <a:buFontTx/>
+                  <a:buNone/>
+                  <a:tabLst/>
+                  <a:defRPr/>
+                </a:pPr>
+                <a:r>
+                  <a:rPr lang="he-IL" smtClean="0"/>
+                  <a:t>המיון אמור לעזור בעיקר בשביל כרטיס במסך בגלל הסתעפויות של תהליכונים</a:t>
+                </a:r>
+                <a:endParaRPr lang="he-IL" dirty="0" smtClean="0"/>
               </a:p>
               <a:p>
                 <a:pPr marL="457200" marR="0" lvl="1" indent="0" algn="r" defTabSz="914400" rtl="1" eaLnBrk="1" fontAlgn="base" latinLnBrk="0" hangingPunct="1">
@@ -11313,20 +11258,32 @@
               <a:bodyPr/>
               <a:lstStyle/>
               <a:p>
-                <a:pPr algn="r"/>
+                <a:pPr marL="0" marR="0" indent="0" algn="r" defTabSz="914400" rtl="0" eaLnBrk="1" fontAlgn="base" latinLnBrk="0" hangingPunct="1">
+                  <a:lnSpc>
+                    <a:spcPct val="100000"/>
+                  </a:lnSpc>
+                  <a:spcBef>
+                    <a:spcPct val="30000"/>
+                  </a:spcBef>
+                  <a:spcAft>
+                    <a:spcPct val="0"/>
+                  </a:spcAft>
+                  <a:buClrTx/>
+                  <a:buSzTx/>
+                  <a:buFontTx/>
+                  <a:buNone/>
+                  <a:tabLst/>
+                  <a:defRPr/>
+                </a:pPr>
                 <a:r>
                   <a:rPr lang="he-IL" dirty="0" smtClean="0"/>
-                  <a:t>לעבור </a:t>
-                </a:r>
-                <a:r>
-                  <a:rPr lang="he-IL" dirty="0" smtClean="0"/>
-                  <a:t>על </a:t>
-                </a:r>
-                <a:r>
-                  <a:rPr lang="he-IL" dirty="0" smtClean="0"/>
-                  <a:t>הנקודות</a:t>
-                </a:r>
-                <a:endParaRPr lang="en-US" dirty="0" smtClean="0"/>
+                  <a:t>בסופו של דבר – המערכת מחפשת מחרוזות</a:t>
+                </a:r>
+                <a:r>
+                  <a:rPr lang="he-IL" baseline="0" dirty="0" smtClean="0"/>
+                  <a:t> קצרות על פני הגנום האנושי.</a:t>
+                </a:r>
+                <a:endParaRPr lang="en-US" baseline="0" dirty="0" smtClean="0"/>
               </a:p>
               <a:p>
                 <a:pPr algn="r"/>
@@ -11336,21 +11293,21 @@
                 <a:pPr algn="r"/>
                 <a:r>
                   <a:rPr lang="he-IL" dirty="0" smtClean="0"/>
-                  <a:t>בסופו </a:t>
+                  <a:t>לעבור </a:t>
                 </a:r>
                 <a:r>
                   <a:rPr lang="he-IL" dirty="0" smtClean="0"/>
-                  <a:t>של דבר – המערכת מחפשת מחרוזות</a:t>
-                </a:r>
-                <a:r>
-                  <a:rPr lang="he-IL" baseline="0" dirty="0" smtClean="0"/>
-                  <a:t> קצרות על פני הגנום האנושי</a:t>
-                </a:r>
-                <a:r>
-                  <a:rPr lang="he-IL" baseline="0" dirty="0" smtClean="0"/>
-                  <a:t>.</a:t>
-                </a:r>
-                <a:endParaRPr lang="en-US" baseline="0" dirty="0" smtClean="0"/>
+                  <a:t>על </a:t>
+                </a:r>
+                <a:r>
+                  <a:rPr lang="he-IL" dirty="0" smtClean="0"/>
+                  <a:t>הנקודות</a:t>
+                </a:r>
+                <a:endParaRPr lang="en-US" dirty="0" smtClean="0"/>
+              </a:p>
+              <a:p>
+                <a:pPr algn="r"/>
+                <a:endParaRPr lang="en-US" dirty="0" smtClean="0"/>
               </a:p>
               <a:p>
                 <a:pPr algn="r"/>
@@ -15886,19 +15843,7 @@
                     <a:ea typeface="+mn-ea"/>
                     <a:cs typeface="+mn-cs"/>
                   </a:rPr>
-                  <a:t>לי </a:t>
-                </a:r>
-                <a:r>
-                  <a:rPr lang="he-IL" sz="1200" kern="1200" baseline="0" dirty="0" smtClean="0">
-                    <a:solidFill>
-                      <a:schemeClr val="tx1"/>
-                    </a:solidFill>
-                    <a:effectLst/>
-                    <a:latin typeface="Arial" pitchFamily="34" charset="0"/>
-                    <a:ea typeface="+mn-ea"/>
-                    <a:cs typeface="+mn-cs"/>
-                  </a:rPr>
-                  <a:t>לקח שעתיים להריץ את האינדוקס.</a:t>
+                  <a:t>לי לקח שעתיים להריץ את האינדוקס.</a:t>
                 </a:r>
                 <a:endParaRPr lang="en-US" sz="1200" kern="1200" dirty="0">
                   <a:solidFill>
@@ -32988,8 +32933,8 @@
           </a:p>
         </p:txBody>
       </p:sp>
-      <mc:AlternateContent xmlns:mc="http://schemas.openxmlformats.org/markup-compatibility/2006">
-        <mc:Choice xmlns:a14="http://schemas.microsoft.com/office/drawing/2010/main" Requires="a14">
+      <mc:AlternateContent xmlns:mc="http://schemas.openxmlformats.org/markup-compatibility/2006" xmlns:a14="http://schemas.microsoft.com/office/drawing/2010/main">
+        <mc:Choice Requires="a14">
           <p:sp>
             <p:nvSpPr>
               <p:cNvPr id="54275" name="Rectangle 3"/>
@@ -33474,7 +33419,7 @@
             </p:txBody>
           </p:sp>
         </mc:Choice>
-        <mc:Fallback>
+        <mc:Fallback xmlns="">
           <p:sp>
             <p:nvSpPr>
               <p:cNvPr id="54275" name="Rectangle 3"/>

</xml_diff>